<commit_message>
Added anova on grade_rep and belonging, added info for presentation
</commit_message>
<xml_diff>
--- a/Presentations/Poster/Poster template 4 columns.pptx
+++ b/Presentations/Poster/Poster template 4 columns.pptx
@@ -256,7 +256,7 @@
             <a:fld id="{0158C5BC-9A70-462C-B28D-9600239EAC64}" type="datetimeFigureOut">
               <a:rPr lang="en-US" smtClean="0"/>
               <a:pPr/>
-              <a:t>7/19/2022</a:t>
+              <a:t>7/20/2022</a:t>
             </a:fld>
             <a:endParaRPr lang="en-US"/>
           </a:p>
@@ -423,7 +423,7 @@
             <a:fld id="{E6CC2317-6751-4CD4-9995-8782DD78E936}" type="datetimeFigureOut">
               <a:rPr lang="en-US" smtClean="0"/>
               <a:pPr/>
-              <a:t>7/19/2022</a:t>
+              <a:t>7/20/2022</a:t>
             </a:fld>
             <a:endParaRPr lang="en-US" dirty="0"/>
           </a:p>
@@ -1694,6 +1694,2016 @@
 </file>
 
 <file path=ppt/slideLayouts/slideLayout2.xml><?xml version="1.0" encoding="utf-8"?>
+<p:sldLayout xmlns:a="http://schemas.openxmlformats.org/drawingml/2006/main" xmlns:r="http://schemas.openxmlformats.org/officeDocument/2006/relationships" xmlns:p="http://schemas.openxmlformats.org/presentationml/2006/main" userDrawn="1">
+  <p:cSld name="Without guides">
+    <p:spTree>
+      <p:nvGrpSpPr>
+        <p:cNvPr id="1" name=""/>
+        <p:cNvGrpSpPr/>
+        <p:nvPr/>
+      </p:nvGrpSpPr>
+      <p:grpSpPr>
+        <a:xfrm>
+          <a:off x="0" y="0"/>
+          <a:ext cx="0" cy="0"/>
+          <a:chOff x="0" y="0"/>
+          <a:chExt cx="0" cy="0"/>
+        </a:xfrm>
+      </p:grpSpPr>
+      <p:sp>
+        <p:nvSpPr>
+          <p:cNvPr id="4" name="Text Placeholder 3"/>
+          <p:cNvSpPr>
+            <a:spLocks noGrp="1"/>
+          </p:cNvSpPr>
+          <p:nvPr>
+            <p:ph type="body" sz="quarter" idx="10" hasCustomPrompt="1"/>
+          </p:nvPr>
+        </p:nvSpPr>
+        <p:spPr>
+          <a:xfrm>
+            <a:off x="448286" y="5866321"/>
+            <a:ext cx="9807648" cy="815457"/>
+          </a:xfrm>
+          <a:prstGeom prst="rect">
+            <a:avLst/>
+          </a:prstGeom>
+        </p:spPr>
+        <p:txBody>
+          <a:bodyPr wrap="square" lIns="228589" tIns="228589" rIns="228589" bIns="228589">
+            <a:spAutoFit/>
+          </a:bodyPr>
+          <a:lstStyle>
+            <a:lvl1pPr marL="0" indent="0">
+              <a:buNone/>
+              <a:defRPr sz="2299">
+                <a:solidFill>
+                  <a:schemeClr val="accent5">
+                    <a:lumMod val="50000"/>
+                  </a:schemeClr>
+                </a:solidFill>
+                <a:latin typeface="Times New Roman" pitchFamily="18" charset="0"/>
+                <a:cs typeface="Times New Roman" pitchFamily="18" charset="0"/>
+              </a:defRPr>
+            </a:lvl1pPr>
+            <a:lvl2pPr marL="1366513" indent="-525582">
+              <a:defRPr sz="2299">
+                <a:latin typeface="Trebuchet MS" pitchFamily="34" charset="0"/>
+              </a:defRPr>
+            </a:lvl2pPr>
+            <a:lvl3pPr marL="1892096" indent="-525582">
+              <a:defRPr sz="2299">
+                <a:latin typeface="Trebuchet MS" pitchFamily="34" charset="0"/>
+              </a:defRPr>
+            </a:lvl3pPr>
+            <a:lvl4pPr marL="2470237" indent="-578141">
+              <a:defRPr sz="2299">
+                <a:latin typeface="Trebuchet MS" pitchFamily="34" charset="0"/>
+              </a:defRPr>
+            </a:lvl4pPr>
+            <a:lvl5pPr marL="2890703" indent="-420466">
+              <a:defRPr sz="2299">
+                <a:latin typeface="Trebuchet MS" pitchFamily="34" charset="0"/>
+              </a:defRPr>
+            </a:lvl5pPr>
+          </a:lstStyle>
+          <a:p>
+            <a:pPr lvl="0"/>
+            <a:r>
+              <a:rPr lang="en-US" dirty="0"/>
+              <a:t>Type in or paste your text here</a:t>
+            </a:r>
+          </a:p>
+        </p:txBody>
+      </p:sp>
+      <p:sp>
+        <p:nvSpPr>
+          <p:cNvPr id="6" name="Text Placeholder 5"/>
+          <p:cNvSpPr>
+            <a:spLocks noGrp="1"/>
+          </p:cNvSpPr>
+          <p:nvPr>
+            <p:ph type="body" sz="quarter" idx="11" hasCustomPrompt="1"/>
+          </p:nvPr>
+        </p:nvSpPr>
+        <p:spPr>
+          <a:xfrm>
+            <a:off x="465989" y="5095798"/>
+            <a:ext cx="9799907" cy="708327"/>
+          </a:xfrm>
+          <a:prstGeom prst="rect">
+            <a:avLst/>
+          </a:prstGeom>
+          <a:noFill/>
+        </p:spPr>
+        <p:txBody>
+          <a:bodyPr lIns="91436" tIns="91436" rIns="91436" bIns="91436" anchor="ctr" anchorCtr="0">
+            <a:spAutoFit/>
+          </a:bodyPr>
+          <a:lstStyle>
+            <a:lvl1pPr marL="0" indent="0" algn="ctr">
+              <a:buNone/>
+              <a:defRPr sz="3403" b="1" u="sng" baseline="0">
+                <a:solidFill>
+                  <a:schemeClr val="accent5">
+                    <a:lumMod val="50000"/>
+                  </a:schemeClr>
+                </a:solidFill>
+              </a:defRPr>
+            </a:lvl1pPr>
+          </a:lstStyle>
+          <a:p>
+            <a:pPr lvl="0"/>
+            <a:r>
+              <a:rPr lang="en-US" dirty="0"/>
+              <a:t>(click to edit) INTRODUCTION or ABSTRACT</a:t>
+            </a:r>
+          </a:p>
+        </p:txBody>
+      </p:sp>
+      <p:sp>
+        <p:nvSpPr>
+          <p:cNvPr id="20" name="Text Placeholder 5"/>
+          <p:cNvSpPr>
+            <a:spLocks noGrp="1"/>
+          </p:cNvSpPr>
+          <p:nvPr>
+            <p:ph type="body" sz="quarter" idx="20" hasCustomPrompt="1"/>
+          </p:nvPr>
+        </p:nvSpPr>
+        <p:spPr>
+          <a:xfrm>
+            <a:off x="465987" y="13063904"/>
+            <a:ext cx="9801454" cy="708327"/>
+          </a:xfrm>
+          <a:prstGeom prst="rect">
+            <a:avLst/>
+          </a:prstGeom>
+          <a:noFill/>
+        </p:spPr>
+        <p:txBody>
+          <a:bodyPr wrap="square" lIns="91436" tIns="91436" rIns="91436" bIns="91436" anchor="ctr" anchorCtr="0">
+            <a:spAutoFit/>
+          </a:bodyPr>
+          <a:lstStyle>
+            <a:lvl1pPr marL="0" indent="0" algn="ctr">
+              <a:buNone/>
+              <a:defRPr sz="3403" b="1" u="sng" baseline="0">
+                <a:solidFill>
+                  <a:schemeClr val="accent5">
+                    <a:lumMod val="50000"/>
+                  </a:schemeClr>
+                </a:solidFill>
+              </a:defRPr>
+            </a:lvl1pPr>
+          </a:lstStyle>
+          <a:p>
+            <a:pPr lvl="0"/>
+            <a:r>
+              <a:rPr lang="en-US" dirty="0"/>
+              <a:t>(click to edit)  OBJECTIVES</a:t>
+            </a:r>
+          </a:p>
+        </p:txBody>
+      </p:sp>
+      <p:sp>
+        <p:nvSpPr>
+          <p:cNvPr id="21" name="Text Placeholder 3"/>
+          <p:cNvSpPr>
+            <a:spLocks noGrp="1"/>
+          </p:cNvSpPr>
+          <p:nvPr>
+            <p:ph type="body" sz="quarter" idx="21" hasCustomPrompt="1"/>
+          </p:nvPr>
+        </p:nvSpPr>
+        <p:spPr>
+          <a:xfrm>
+            <a:off x="11176227" y="5866321"/>
+            <a:ext cx="9799906" cy="815457"/>
+          </a:xfrm>
+          <a:prstGeom prst="rect">
+            <a:avLst/>
+          </a:prstGeom>
+        </p:spPr>
+        <p:txBody>
+          <a:bodyPr wrap="square" lIns="228589" tIns="228589" rIns="228589" bIns="228589">
+            <a:spAutoFit/>
+          </a:bodyPr>
+          <a:lstStyle>
+            <a:lvl1pPr marL="0" indent="0">
+              <a:buNone/>
+              <a:defRPr sz="2299">
+                <a:solidFill>
+                  <a:schemeClr val="accent5">
+                    <a:lumMod val="50000"/>
+                  </a:schemeClr>
+                </a:solidFill>
+                <a:latin typeface="Times New Roman" pitchFamily="18" charset="0"/>
+                <a:cs typeface="Times New Roman" pitchFamily="18" charset="0"/>
+              </a:defRPr>
+            </a:lvl1pPr>
+            <a:lvl2pPr marL="1366513" indent="-525582">
+              <a:defRPr sz="2299">
+                <a:latin typeface="Trebuchet MS" pitchFamily="34" charset="0"/>
+              </a:defRPr>
+            </a:lvl2pPr>
+            <a:lvl3pPr marL="1892096" indent="-525582">
+              <a:defRPr sz="2299">
+                <a:latin typeface="Trebuchet MS" pitchFamily="34" charset="0"/>
+              </a:defRPr>
+            </a:lvl3pPr>
+            <a:lvl4pPr marL="2470237" indent="-578141">
+              <a:defRPr sz="2299">
+                <a:latin typeface="Trebuchet MS" pitchFamily="34" charset="0"/>
+              </a:defRPr>
+            </a:lvl4pPr>
+            <a:lvl5pPr marL="2890703" indent="-420466">
+              <a:defRPr sz="2299">
+                <a:latin typeface="Trebuchet MS" pitchFamily="34" charset="0"/>
+              </a:defRPr>
+            </a:lvl5pPr>
+          </a:lstStyle>
+          <a:p>
+            <a:pPr lvl="0"/>
+            <a:r>
+              <a:rPr lang="en-US" dirty="0"/>
+              <a:t>Type in or paste your text here</a:t>
+            </a:r>
+          </a:p>
+        </p:txBody>
+      </p:sp>
+      <p:sp>
+        <p:nvSpPr>
+          <p:cNvPr id="22" name="Text Placeholder 5"/>
+          <p:cNvSpPr>
+            <a:spLocks noGrp="1"/>
+          </p:cNvSpPr>
+          <p:nvPr>
+            <p:ph type="body" sz="quarter" idx="22" hasCustomPrompt="1"/>
+          </p:nvPr>
+        </p:nvSpPr>
+        <p:spPr>
+          <a:xfrm>
+            <a:off x="11176228" y="5095798"/>
+            <a:ext cx="9799907" cy="708327"/>
+          </a:xfrm>
+          <a:prstGeom prst="rect">
+            <a:avLst/>
+          </a:prstGeom>
+          <a:noFill/>
+        </p:spPr>
+        <p:txBody>
+          <a:bodyPr lIns="91436" tIns="91436" rIns="91436" bIns="91436" anchor="ctr" anchorCtr="0">
+            <a:spAutoFit/>
+          </a:bodyPr>
+          <a:lstStyle>
+            <a:lvl1pPr marL="0" indent="0" algn="ctr">
+              <a:buNone/>
+              <a:defRPr sz="3403" b="1" u="sng" baseline="0">
+                <a:solidFill>
+                  <a:schemeClr val="accent5">
+                    <a:lumMod val="50000"/>
+                  </a:schemeClr>
+                </a:solidFill>
+              </a:defRPr>
+            </a:lvl1pPr>
+          </a:lstStyle>
+          <a:p>
+            <a:pPr lvl="0"/>
+            <a:r>
+              <a:rPr lang="en-US" dirty="0"/>
+              <a:t>(click to edit)  MATERIALS &amp; METHODS</a:t>
+            </a:r>
+          </a:p>
+        </p:txBody>
+      </p:sp>
+      <p:sp>
+        <p:nvSpPr>
+          <p:cNvPr id="23" name="Text Placeholder 3"/>
+          <p:cNvSpPr>
+            <a:spLocks noGrp="1"/>
+          </p:cNvSpPr>
+          <p:nvPr>
+            <p:ph type="body" sz="quarter" idx="23" hasCustomPrompt="1"/>
+          </p:nvPr>
+        </p:nvSpPr>
+        <p:spPr>
+          <a:xfrm>
+            <a:off x="21830729" y="5866321"/>
+            <a:ext cx="9799906" cy="815457"/>
+          </a:xfrm>
+          <a:prstGeom prst="rect">
+            <a:avLst/>
+          </a:prstGeom>
+        </p:spPr>
+        <p:txBody>
+          <a:bodyPr wrap="square" lIns="228589" tIns="228589" rIns="228589" bIns="228589">
+            <a:spAutoFit/>
+          </a:bodyPr>
+          <a:lstStyle>
+            <a:lvl1pPr marL="0" indent="0">
+              <a:buNone/>
+              <a:defRPr sz="2299">
+                <a:solidFill>
+                  <a:schemeClr val="accent5">
+                    <a:lumMod val="50000"/>
+                  </a:schemeClr>
+                </a:solidFill>
+                <a:latin typeface="Times New Roman" pitchFamily="18" charset="0"/>
+                <a:cs typeface="Times New Roman" pitchFamily="18" charset="0"/>
+              </a:defRPr>
+            </a:lvl1pPr>
+            <a:lvl2pPr marL="1366513" indent="-525582">
+              <a:defRPr sz="2299">
+                <a:latin typeface="Trebuchet MS" pitchFamily="34" charset="0"/>
+              </a:defRPr>
+            </a:lvl2pPr>
+            <a:lvl3pPr marL="1892096" indent="-525582">
+              <a:defRPr sz="2299">
+                <a:latin typeface="Trebuchet MS" pitchFamily="34" charset="0"/>
+              </a:defRPr>
+            </a:lvl3pPr>
+            <a:lvl4pPr marL="2470237" indent="-578141">
+              <a:defRPr sz="2299">
+                <a:latin typeface="Trebuchet MS" pitchFamily="34" charset="0"/>
+              </a:defRPr>
+            </a:lvl4pPr>
+            <a:lvl5pPr marL="2890703" indent="-420466">
+              <a:defRPr sz="2299">
+                <a:latin typeface="Trebuchet MS" pitchFamily="34" charset="0"/>
+              </a:defRPr>
+            </a:lvl5pPr>
+          </a:lstStyle>
+          <a:p>
+            <a:pPr lvl="0"/>
+            <a:r>
+              <a:rPr lang="en-US" dirty="0"/>
+              <a:t>Type in or paste your text here</a:t>
+            </a:r>
+          </a:p>
+        </p:txBody>
+      </p:sp>
+      <p:sp>
+        <p:nvSpPr>
+          <p:cNvPr id="24" name="Text Placeholder 5"/>
+          <p:cNvSpPr>
+            <a:spLocks noGrp="1"/>
+          </p:cNvSpPr>
+          <p:nvPr>
+            <p:ph type="body" sz="quarter" idx="24" hasCustomPrompt="1"/>
+          </p:nvPr>
+        </p:nvSpPr>
+        <p:spPr>
+          <a:xfrm>
+            <a:off x="21822987" y="5095798"/>
+            <a:ext cx="9809196" cy="708327"/>
+          </a:xfrm>
+          <a:prstGeom prst="rect">
+            <a:avLst/>
+          </a:prstGeom>
+          <a:noFill/>
+        </p:spPr>
+        <p:txBody>
+          <a:bodyPr lIns="91436" tIns="91436" rIns="91436" bIns="91436" anchor="ctr" anchorCtr="0">
+            <a:spAutoFit/>
+          </a:bodyPr>
+          <a:lstStyle>
+            <a:lvl1pPr marL="0" indent="0" algn="ctr">
+              <a:buNone/>
+              <a:defRPr sz="3403" b="1" u="sng" baseline="0">
+                <a:solidFill>
+                  <a:schemeClr val="accent5">
+                    <a:lumMod val="50000"/>
+                  </a:schemeClr>
+                </a:solidFill>
+              </a:defRPr>
+            </a:lvl1pPr>
+          </a:lstStyle>
+          <a:p>
+            <a:pPr lvl="0"/>
+            <a:r>
+              <a:rPr lang="en-US" dirty="0"/>
+              <a:t>(click to edit)  RESULTS</a:t>
+            </a:r>
+          </a:p>
+        </p:txBody>
+      </p:sp>
+      <p:sp>
+        <p:nvSpPr>
+          <p:cNvPr id="25" name="Text Placeholder 5"/>
+          <p:cNvSpPr>
+            <a:spLocks noGrp="1"/>
+          </p:cNvSpPr>
+          <p:nvPr>
+            <p:ph type="body" sz="quarter" idx="25" hasCustomPrompt="1"/>
+          </p:nvPr>
+        </p:nvSpPr>
+        <p:spPr>
+          <a:xfrm>
+            <a:off x="32563023" y="5095798"/>
+            <a:ext cx="9798096" cy="708327"/>
+          </a:xfrm>
+          <a:prstGeom prst="rect">
+            <a:avLst/>
+          </a:prstGeom>
+          <a:noFill/>
+        </p:spPr>
+        <p:txBody>
+          <a:bodyPr wrap="square" lIns="91436" tIns="91436" rIns="91436" bIns="91436" anchor="ctr" anchorCtr="0">
+            <a:spAutoFit/>
+          </a:bodyPr>
+          <a:lstStyle>
+            <a:lvl1pPr marL="0" indent="0" algn="ctr">
+              <a:buNone/>
+              <a:defRPr sz="3403" b="1" u="sng" baseline="0">
+                <a:solidFill>
+                  <a:schemeClr val="accent5">
+                    <a:lumMod val="50000"/>
+                  </a:schemeClr>
+                </a:solidFill>
+              </a:defRPr>
+            </a:lvl1pPr>
+          </a:lstStyle>
+          <a:p>
+            <a:pPr lvl="0"/>
+            <a:r>
+              <a:rPr lang="en-US" dirty="0"/>
+              <a:t>(click to edit)  CONCLUSIONS</a:t>
+            </a:r>
+          </a:p>
+        </p:txBody>
+      </p:sp>
+      <p:sp>
+        <p:nvSpPr>
+          <p:cNvPr id="26" name="Text Placeholder 3"/>
+          <p:cNvSpPr>
+            <a:spLocks noGrp="1"/>
+          </p:cNvSpPr>
+          <p:nvPr>
+            <p:ph type="body" sz="quarter" idx="26" hasCustomPrompt="1"/>
+          </p:nvPr>
+        </p:nvSpPr>
+        <p:spPr>
+          <a:xfrm>
+            <a:off x="32563023" y="5866321"/>
+            <a:ext cx="9798096" cy="815457"/>
+          </a:xfrm>
+          <a:prstGeom prst="rect">
+            <a:avLst/>
+          </a:prstGeom>
+        </p:spPr>
+        <p:txBody>
+          <a:bodyPr wrap="square" lIns="228589" tIns="228589" rIns="228589" bIns="228589">
+            <a:spAutoFit/>
+          </a:bodyPr>
+          <a:lstStyle>
+            <a:lvl1pPr marL="0" indent="0">
+              <a:buNone/>
+              <a:defRPr sz="2299">
+                <a:solidFill>
+                  <a:schemeClr val="accent5">
+                    <a:lumMod val="50000"/>
+                  </a:schemeClr>
+                </a:solidFill>
+                <a:latin typeface="Times New Roman" pitchFamily="18" charset="0"/>
+                <a:cs typeface="Times New Roman" pitchFamily="18" charset="0"/>
+              </a:defRPr>
+            </a:lvl1pPr>
+            <a:lvl2pPr marL="1366513" indent="-525582">
+              <a:defRPr sz="2299">
+                <a:latin typeface="Trebuchet MS" pitchFamily="34" charset="0"/>
+              </a:defRPr>
+            </a:lvl2pPr>
+            <a:lvl3pPr marL="1892096" indent="-525582">
+              <a:defRPr sz="2299">
+                <a:latin typeface="Trebuchet MS" pitchFamily="34" charset="0"/>
+              </a:defRPr>
+            </a:lvl3pPr>
+            <a:lvl4pPr marL="2470237" indent="-578141">
+              <a:defRPr sz="2299">
+                <a:latin typeface="Trebuchet MS" pitchFamily="34" charset="0"/>
+              </a:defRPr>
+            </a:lvl4pPr>
+            <a:lvl5pPr marL="2890703" indent="-420466">
+              <a:defRPr sz="2299">
+                <a:latin typeface="Trebuchet MS" pitchFamily="34" charset="0"/>
+              </a:defRPr>
+            </a:lvl5pPr>
+          </a:lstStyle>
+          <a:p>
+            <a:pPr lvl="0"/>
+            <a:r>
+              <a:rPr lang="en-US" dirty="0"/>
+              <a:t>Type in or paste your text here</a:t>
+            </a:r>
+          </a:p>
+        </p:txBody>
+      </p:sp>
+      <p:sp>
+        <p:nvSpPr>
+          <p:cNvPr id="27" name="Text Placeholder 5"/>
+          <p:cNvSpPr>
+            <a:spLocks noGrp="1"/>
+          </p:cNvSpPr>
+          <p:nvPr>
+            <p:ph type="body" sz="quarter" idx="27" hasCustomPrompt="1"/>
+          </p:nvPr>
+        </p:nvSpPr>
+        <p:spPr>
+          <a:xfrm>
+            <a:off x="32563023" y="13119293"/>
+            <a:ext cx="9798096" cy="708327"/>
+          </a:xfrm>
+          <a:prstGeom prst="rect">
+            <a:avLst/>
+          </a:prstGeom>
+          <a:noFill/>
+        </p:spPr>
+        <p:txBody>
+          <a:bodyPr wrap="square" lIns="91436" tIns="91436" rIns="91436" bIns="91436" anchor="ctr" anchorCtr="0">
+            <a:spAutoFit/>
+          </a:bodyPr>
+          <a:lstStyle>
+            <a:lvl1pPr marL="0" indent="0" algn="ctr">
+              <a:buNone/>
+              <a:defRPr sz="3403" b="1" u="sng" baseline="0">
+                <a:solidFill>
+                  <a:schemeClr val="accent5">
+                    <a:lumMod val="50000"/>
+                  </a:schemeClr>
+                </a:solidFill>
+              </a:defRPr>
+            </a:lvl1pPr>
+          </a:lstStyle>
+          <a:p>
+            <a:pPr lvl="0"/>
+            <a:r>
+              <a:rPr lang="en-US" dirty="0"/>
+              <a:t>(click to edit)  REFERENCES</a:t>
+            </a:r>
+          </a:p>
+        </p:txBody>
+      </p:sp>
+      <p:sp>
+        <p:nvSpPr>
+          <p:cNvPr id="28" name="Text Placeholder 3"/>
+          <p:cNvSpPr>
+            <a:spLocks noGrp="1"/>
+          </p:cNvSpPr>
+          <p:nvPr>
+            <p:ph type="body" sz="quarter" idx="28" hasCustomPrompt="1"/>
+          </p:nvPr>
+        </p:nvSpPr>
+        <p:spPr>
+          <a:xfrm>
+            <a:off x="32563023" y="13806060"/>
+            <a:ext cx="9803003" cy="815457"/>
+          </a:xfrm>
+          <a:prstGeom prst="rect">
+            <a:avLst/>
+          </a:prstGeom>
+        </p:spPr>
+        <p:txBody>
+          <a:bodyPr wrap="square" lIns="228589" tIns="228589" rIns="228589" bIns="228589">
+            <a:spAutoFit/>
+          </a:bodyPr>
+          <a:lstStyle>
+            <a:lvl1pPr marL="0" indent="0">
+              <a:buNone/>
+              <a:defRPr sz="2299">
+                <a:solidFill>
+                  <a:schemeClr val="accent5">
+                    <a:lumMod val="50000"/>
+                  </a:schemeClr>
+                </a:solidFill>
+                <a:latin typeface="Times New Roman" pitchFamily="18" charset="0"/>
+                <a:cs typeface="Times New Roman" pitchFamily="18" charset="0"/>
+              </a:defRPr>
+            </a:lvl1pPr>
+            <a:lvl2pPr marL="1366513" indent="-525582">
+              <a:defRPr sz="2299">
+                <a:latin typeface="Trebuchet MS" pitchFamily="34" charset="0"/>
+              </a:defRPr>
+            </a:lvl2pPr>
+            <a:lvl3pPr marL="1892096" indent="-525582">
+              <a:defRPr sz="2299">
+                <a:latin typeface="Trebuchet MS" pitchFamily="34" charset="0"/>
+              </a:defRPr>
+            </a:lvl3pPr>
+            <a:lvl4pPr marL="2470237" indent="-578141">
+              <a:defRPr sz="2299">
+                <a:latin typeface="Trebuchet MS" pitchFamily="34" charset="0"/>
+              </a:defRPr>
+            </a:lvl4pPr>
+            <a:lvl5pPr marL="2890703" indent="-420466">
+              <a:defRPr sz="2299">
+                <a:latin typeface="Trebuchet MS" pitchFamily="34" charset="0"/>
+              </a:defRPr>
+            </a:lvl5pPr>
+          </a:lstStyle>
+          <a:p>
+            <a:pPr lvl="0"/>
+            <a:r>
+              <a:rPr lang="en-US" dirty="0"/>
+              <a:t>Type in or paste your text here</a:t>
+            </a:r>
+          </a:p>
+        </p:txBody>
+      </p:sp>
+      <p:sp>
+        <p:nvSpPr>
+          <p:cNvPr id="29" name="Text Placeholder 5"/>
+          <p:cNvSpPr>
+            <a:spLocks noGrp="1"/>
+          </p:cNvSpPr>
+          <p:nvPr>
+            <p:ph type="body" sz="quarter" idx="29" hasCustomPrompt="1"/>
+          </p:nvPr>
+        </p:nvSpPr>
+        <p:spPr>
+          <a:xfrm>
+            <a:off x="32563023" y="23610057"/>
+            <a:ext cx="9798096" cy="708327"/>
+          </a:xfrm>
+          <a:prstGeom prst="rect">
+            <a:avLst/>
+          </a:prstGeom>
+          <a:noFill/>
+        </p:spPr>
+        <p:txBody>
+          <a:bodyPr wrap="square" lIns="91436" tIns="91436" rIns="91436" bIns="91436" anchor="ctr" anchorCtr="0">
+            <a:spAutoFit/>
+          </a:bodyPr>
+          <a:lstStyle>
+            <a:lvl1pPr marL="0" indent="0" algn="ctr">
+              <a:buNone/>
+              <a:defRPr sz="3403" b="1" u="sng" baseline="0">
+                <a:solidFill>
+                  <a:schemeClr val="accent5">
+                    <a:lumMod val="50000"/>
+                  </a:schemeClr>
+                </a:solidFill>
+              </a:defRPr>
+            </a:lvl1pPr>
+          </a:lstStyle>
+          <a:p>
+            <a:pPr lvl="0"/>
+            <a:r>
+              <a:rPr lang="en-US" dirty="0"/>
+              <a:t>(click to edit)  ACKNOWLEDGEMENTS or  CONTACT</a:t>
+            </a:r>
+          </a:p>
+        </p:txBody>
+      </p:sp>
+      <p:sp>
+        <p:nvSpPr>
+          <p:cNvPr id="30" name="Text Placeholder 3"/>
+          <p:cNvSpPr>
+            <a:spLocks noGrp="1"/>
+          </p:cNvSpPr>
+          <p:nvPr>
+            <p:ph type="body" sz="quarter" idx="30" hasCustomPrompt="1"/>
+          </p:nvPr>
+        </p:nvSpPr>
+        <p:spPr>
+          <a:xfrm>
+            <a:off x="32563023" y="24310970"/>
+            <a:ext cx="9803003" cy="815457"/>
+          </a:xfrm>
+          <a:prstGeom prst="rect">
+            <a:avLst/>
+          </a:prstGeom>
+        </p:spPr>
+        <p:txBody>
+          <a:bodyPr wrap="square" lIns="228589" tIns="228589" rIns="228589" bIns="228589">
+            <a:spAutoFit/>
+          </a:bodyPr>
+          <a:lstStyle>
+            <a:lvl1pPr marL="0" indent="0">
+              <a:buNone/>
+              <a:defRPr sz="2299">
+                <a:solidFill>
+                  <a:schemeClr val="accent5">
+                    <a:lumMod val="50000"/>
+                  </a:schemeClr>
+                </a:solidFill>
+                <a:latin typeface="Times New Roman" pitchFamily="18" charset="0"/>
+                <a:cs typeface="Times New Roman" pitchFamily="18" charset="0"/>
+              </a:defRPr>
+            </a:lvl1pPr>
+            <a:lvl2pPr marL="1366513" indent="-525582">
+              <a:defRPr sz="2299">
+                <a:latin typeface="Trebuchet MS" pitchFamily="34" charset="0"/>
+              </a:defRPr>
+            </a:lvl2pPr>
+            <a:lvl3pPr marL="1892096" indent="-525582">
+              <a:defRPr sz="2299">
+                <a:latin typeface="Trebuchet MS" pitchFamily="34" charset="0"/>
+              </a:defRPr>
+            </a:lvl3pPr>
+            <a:lvl4pPr marL="2470237" indent="-578141">
+              <a:defRPr sz="2299">
+                <a:latin typeface="Trebuchet MS" pitchFamily="34" charset="0"/>
+              </a:defRPr>
+            </a:lvl4pPr>
+            <a:lvl5pPr marL="2890703" indent="-420466">
+              <a:defRPr sz="2299">
+                <a:latin typeface="Trebuchet MS" pitchFamily="34" charset="0"/>
+              </a:defRPr>
+            </a:lvl5pPr>
+          </a:lstStyle>
+          <a:p>
+            <a:pPr lvl="0"/>
+            <a:r>
+              <a:rPr lang="en-US" dirty="0"/>
+              <a:t>Type in or paste your text here</a:t>
+            </a:r>
+          </a:p>
+        </p:txBody>
+      </p:sp>
+      <p:sp>
+        <p:nvSpPr>
+          <p:cNvPr id="60" name="Text Placeholder 3"/>
+          <p:cNvSpPr>
+            <a:spLocks noGrp="1"/>
+          </p:cNvSpPr>
+          <p:nvPr>
+            <p:ph type="body" sz="quarter" idx="96" hasCustomPrompt="1"/>
+          </p:nvPr>
+        </p:nvSpPr>
+        <p:spPr>
+          <a:xfrm>
+            <a:off x="448286" y="13751016"/>
+            <a:ext cx="9807648" cy="815457"/>
+          </a:xfrm>
+          <a:prstGeom prst="rect">
+            <a:avLst/>
+          </a:prstGeom>
+        </p:spPr>
+        <p:txBody>
+          <a:bodyPr wrap="square" lIns="228589" tIns="228589" rIns="228589" bIns="228589">
+            <a:spAutoFit/>
+          </a:bodyPr>
+          <a:lstStyle>
+            <a:lvl1pPr marL="0" indent="0">
+              <a:buNone/>
+              <a:defRPr sz="2299">
+                <a:solidFill>
+                  <a:schemeClr val="accent5">
+                    <a:lumMod val="50000"/>
+                  </a:schemeClr>
+                </a:solidFill>
+                <a:latin typeface="Times New Roman" pitchFamily="18" charset="0"/>
+                <a:cs typeface="Times New Roman" pitchFamily="18" charset="0"/>
+              </a:defRPr>
+            </a:lvl1pPr>
+            <a:lvl2pPr marL="1366513" indent="-525582">
+              <a:defRPr sz="2299">
+                <a:latin typeface="Trebuchet MS" pitchFamily="34" charset="0"/>
+              </a:defRPr>
+            </a:lvl2pPr>
+            <a:lvl3pPr marL="1892096" indent="-525582">
+              <a:defRPr sz="2299">
+                <a:latin typeface="Trebuchet MS" pitchFamily="34" charset="0"/>
+              </a:defRPr>
+            </a:lvl3pPr>
+            <a:lvl4pPr marL="2470237" indent="-578141">
+              <a:defRPr sz="2299">
+                <a:latin typeface="Trebuchet MS" pitchFamily="34" charset="0"/>
+              </a:defRPr>
+            </a:lvl4pPr>
+            <a:lvl5pPr marL="2890703" indent="-420466">
+              <a:defRPr sz="2299">
+                <a:latin typeface="Trebuchet MS" pitchFamily="34" charset="0"/>
+              </a:defRPr>
+            </a:lvl5pPr>
+          </a:lstStyle>
+          <a:p>
+            <a:pPr lvl="0"/>
+            <a:r>
+              <a:rPr lang="en-US" dirty="0"/>
+              <a:t>Type in or paste your text here</a:t>
+            </a:r>
+          </a:p>
+        </p:txBody>
+      </p:sp>
+      <p:sp>
+        <p:nvSpPr>
+          <p:cNvPr id="77" name="Text Placeholder 76"/>
+          <p:cNvSpPr>
+            <a:spLocks noGrp="1"/>
+          </p:cNvSpPr>
+          <p:nvPr>
+            <p:ph type="body" sz="quarter" idx="150" hasCustomPrompt="1"/>
+          </p:nvPr>
+        </p:nvSpPr>
+        <p:spPr>
+          <a:xfrm>
+            <a:off x="5785609" y="3112233"/>
+            <a:ext cx="31206170" cy="1177369"/>
+          </a:xfrm>
+          <a:prstGeom prst="rect">
+            <a:avLst/>
+          </a:prstGeom>
+        </p:spPr>
+        <p:txBody>
+          <a:bodyPr>
+            <a:normAutofit/>
+          </a:bodyPr>
+          <a:lstStyle>
+            <a:lvl1pPr marL="0" indent="0" algn="ctr">
+              <a:buFontTx/>
+              <a:buNone/>
+              <a:defRPr sz="5518">
+                <a:solidFill>
+                  <a:schemeClr val="accent5">
+                    <a:lumMod val="50000"/>
+                  </a:schemeClr>
+                </a:solidFill>
+                <a:latin typeface="+mj-lt"/>
+              </a:defRPr>
+            </a:lvl1pPr>
+            <a:lvl2pPr>
+              <a:buFontTx/>
+              <a:buNone/>
+              <a:defRPr sz="6622"/>
+            </a:lvl2pPr>
+            <a:lvl3pPr>
+              <a:buFontTx/>
+              <a:buNone/>
+              <a:defRPr sz="6622"/>
+            </a:lvl3pPr>
+            <a:lvl4pPr>
+              <a:buFontTx/>
+              <a:buNone/>
+              <a:defRPr sz="6622"/>
+            </a:lvl4pPr>
+            <a:lvl5pPr>
+              <a:buFontTx/>
+              <a:buNone/>
+              <a:defRPr sz="6622"/>
+            </a:lvl5pPr>
+          </a:lstStyle>
+          <a:p>
+            <a:pPr lvl="0"/>
+            <a:r>
+              <a:rPr lang="en-US" dirty="0"/>
+              <a:t>Click here to add affiliations</a:t>
+            </a:r>
+          </a:p>
+        </p:txBody>
+      </p:sp>
+      <p:sp>
+        <p:nvSpPr>
+          <p:cNvPr id="78" name="Text Placeholder 76"/>
+          <p:cNvSpPr>
+            <a:spLocks noGrp="1"/>
+          </p:cNvSpPr>
+          <p:nvPr>
+            <p:ph type="body" sz="quarter" idx="151" hasCustomPrompt="1"/>
+          </p:nvPr>
+        </p:nvSpPr>
+        <p:spPr>
+          <a:xfrm>
+            <a:off x="5785609" y="1934863"/>
+            <a:ext cx="31206170" cy="1177369"/>
+          </a:xfrm>
+          <a:prstGeom prst="rect">
+            <a:avLst/>
+          </a:prstGeom>
+        </p:spPr>
+        <p:txBody>
+          <a:bodyPr anchor="t" anchorCtr="1">
+            <a:normAutofit/>
+          </a:bodyPr>
+          <a:lstStyle>
+            <a:lvl1pPr marL="0" indent="0" algn="ctr">
+              <a:buFontTx/>
+              <a:buNone/>
+              <a:defRPr sz="8093">
+                <a:solidFill>
+                  <a:schemeClr val="accent5">
+                    <a:lumMod val="50000"/>
+                  </a:schemeClr>
+                </a:solidFill>
+                <a:latin typeface="+mj-lt"/>
+              </a:defRPr>
+            </a:lvl1pPr>
+            <a:lvl2pPr>
+              <a:buFontTx/>
+              <a:buNone/>
+              <a:defRPr sz="6622"/>
+            </a:lvl2pPr>
+            <a:lvl3pPr>
+              <a:buFontTx/>
+              <a:buNone/>
+              <a:defRPr sz="6622"/>
+            </a:lvl3pPr>
+            <a:lvl4pPr>
+              <a:buFontTx/>
+              <a:buNone/>
+              <a:defRPr sz="6622"/>
+            </a:lvl4pPr>
+            <a:lvl5pPr>
+              <a:buFontTx/>
+              <a:buNone/>
+              <a:defRPr sz="6622"/>
+            </a:lvl5pPr>
+          </a:lstStyle>
+          <a:p>
+            <a:pPr lvl="0"/>
+            <a:r>
+              <a:rPr lang="en-US" dirty="0"/>
+              <a:t>Click here to add authors</a:t>
+            </a:r>
+          </a:p>
+        </p:txBody>
+      </p:sp>
+      <p:sp>
+        <p:nvSpPr>
+          <p:cNvPr id="79" name="Text Placeholder 76"/>
+          <p:cNvSpPr>
+            <a:spLocks noGrp="1"/>
+          </p:cNvSpPr>
+          <p:nvPr>
+            <p:ph type="body" sz="quarter" idx="153" hasCustomPrompt="1"/>
+          </p:nvPr>
+        </p:nvSpPr>
+        <p:spPr>
+          <a:xfrm>
+            <a:off x="5785609" y="428411"/>
+            <a:ext cx="31206170" cy="1506452"/>
+          </a:xfrm>
+          <a:prstGeom prst="rect">
+            <a:avLst/>
+          </a:prstGeom>
+        </p:spPr>
+        <p:txBody>
+          <a:bodyPr anchor="t" anchorCtr="1">
+            <a:normAutofit/>
+          </a:bodyPr>
+          <a:lstStyle>
+            <a:lvl1pPr marL="0" indent="0" algn="ctr">
+              <a:buFontTx/>
+              <a:buNone/>
+              <a:defRPr sz="10577" b="1">
+                <a:solidFill>
+                  <a:schemeClr val="accent5">
+                    <a:lumMod val="50000"/>
+                  </a:schemeClr>
+                </a:solidFill>
+                <a:latin typeface="+mj-lt"/>
+              </a:defRPr>
+            </a:lvl1pPr>
+            <a:lvl2pPr>
+              <a:buFontTx/>
+              <a:buNone/>
+              <a:defRPr sz="6622"/>
+            </a:lvl2pPr>
+            <a:lvl3pPr>
+              <a:buFontTx/>
+              <a:buNone/>
+              <a:defRPr sz="6622"/>
+            </a:lvl3pPr>
+            <a:lvl4pPr>
+              <a:buFontTx/>
+              <a:buNone/>
+              <a:defRPr sz="6622"/>
+            </a:lvl4pPr>
+            <a:lvl5pPr>
+              <a:buFontTx/>
+              <a:buNone/>
+              <a:defRPr sz="6622"/>
+            </a:lvl5pPr>
+          </a:lstStyle>
+          <a:p>
+            <a:pPr lvl="0"/>
+            <a:r>
+              <a:rPr lang="en-US" dirty="0"/>
+              <a:t>Click here to add title</a:t>
+            </a:r>
+          </a:p>
+        </p:txBody>
+      </p:sp>
+    </p:spTree>
+    <p:extLst>
+      <p:ext uri="{BB962C8B-B14F-4D97-AF65-F5344CB8AC3E}">
+        <p14:creationId xmlns:p14="http://schemas.microsoft.com/office/powerpoint/2010/main" val="4263691306"/>
+      </p:ext>
+    </p:extLst>
+  </p:cSld>
+  <p:clrMapOvr>
+    <a:masterClrMapping/>
+  </p:clrMapOvr>
+</p:sldLayout>
+</file>
+
+<file path=ppt/slideLayouts/slideLayout3.xml><?xml version="1.0" encoding="utf-8"?>
+<p:sldLayout xmlns:a="http://schemas.openxmlformats.org/drawingml/2006/main" xmlns:r="http://schemas.openxmlformats.org/officeDocument/2006/relationships" xmlns:p="http://schemas.openxmlformats.org/presentationml/2006/main" userDrawn="1">
+  <p:cSld name="1_Without guides">
+    <p:spTree>
+      <p:nvGrpSpPr>
+        <p:cNvPr id="1" name=""/>
+        <p:cNvGrpSpPr/>
+        <p:nvPr/>
+      </p:nvGrpSpPr>
+      <p:grpSpPr>
+        <a:xfrm>
+          <a:off x="0" y="0"/>
+          <a:ext cx="0" cy="0"/>
+          <a:chOff x="0" y="0"/>
+          <a:chExt cx="0" cy="0"/>
+        </a:xfrm>
+      </p:grpSpPr>
+      <p:sp>
+        <p:nvSpPr>
+          <p:cNvPr id="4" name="Text Placeholder 3"/>
+          <p:cNvSpPr>
+            <a:spLocks noGrp="1"/>
+          </p:cNvSpPr>
+          <p:nvPr>
+            <p:ph type="body" sz="quarter" idx="10" hasCustomPrompt="1"/>
+          </p:nvPr>
+        </p:nvSpPr>
+        <p:spPr>
+          <a:xfrm>
+            <a:off x="448286" y="5866321"/>
+            <a:ext cx="9807648" cy="815457"/>
+          </a:xfrm>
+          <a:prstGeom prst="rect">
+            <a:avLst/>
+          </a:prstGeom>
+        </p:spPr>
+        <p:txBody>
+          <a:bodyPr wrap="square" lIns="228589" tIns="228589" rIns="228589" bIns="228589">
+            <a:spAutoFit/>
+          </a:bodyPr>
+          <a:lstStyle>
+            <a:lvl1pPr marL="0" indent="0">
+              <a:buNone/>
+              <a:defRPr sz="2299">
+                <a:solidFill>
+                  <a:schemeClr val="accent5">
+                    <a:lumMod val="50000"/>
+                  </a:schemeClr>
+                </a:solidFill>
+                <a:latin typeface="Times New Roman" pitchFamily="18" charset="0"/>
+                <a:cs typeface="Times New Roman" pitchFamily="18" charset="0"/>
+              </a:defRPr>
+            </a:lvl1pPr>
+            <a:lvl2pPr marL="1366513" indent="-525582">
+              <a:defRPr sz="2299">
+                <a:latin typeface="Trebuchet MS" pitchFamily="34" charset="0"/>
+              </a:defRPr>
+            </a:lvl2pPr>
+            <a:lvl3pPr marL="1892096" indent="-525582">
+              <a:defRPr sz="2299">
+                <a:latin typeface="Trebuchet MS" pitchFamily="34" charset="0"/>
+              </a:defRPr>
+            </a:lvl3pPr>
+            <a:lvl4pPr marL="2470237" indent="-578141">
+              <a:defRPr sz="2299">
+                <a:latin typeface="Trebuchet MS" pitchFamily="34" charset="0"/>
+              </a:defRPr>
+            </a:lvl4pPr>
+            <a:lvl5pPr marL="2890703" indent="-420466">
+              <a:defRPr sz="2299">
+                <a:latin typeface="Trebuchet MS" pitchFamily="34" charset="0"/>
+              </a:defRPr>
+            </a:lvl5pPr>
+          </a:lstStyle>
+          <a:p>
+            <a:pPr lvl="0"/>
+            <a:r>
+              <a:rPr lang="en-US" dirty="0"/>
+              <a:t>Type in or paste your text here</a:t>
+            </a:r>
+          </a:p>
+        </p:txBody>
+      </p:sp>
+      <p:sp>
+        <p:nvSpPr>
+          <p:cNvPr id="6" name="Text Placeholder 5"/>
+          <p:cNvSpPr>
+            <a:spLocks noGrp="1"/>
+          </p:cNvSpPr>
+          <p:nvPr>
+            <p:ph type="body" sz="quarter" idx="11" hasCustomPrompt="1"/>
+          </p:nvPr>
+        </p:nvSpPr>
+        <p:spPr>
+          <a:xfrm>
+            <a:off x="465989" y="5095798"/>
+            <a:ext cx="9799907" cy="708327"/>
+          </a:xfrm>
+          <a:prstGeom prst="rect">
+            <a:avLst/>
+          </a:prstGeom>
+          <a:noFill/>
+        </p:spPr>
+        <p:txBody>
+          <a:bodyPr lIns="91436" tIns="91436" rIns="91436" bIns="91436" anchor="ctr" anchorCtr="0">
+            <a:spAutoFit/>
+          </a:bodyPr>
+          <a:lstStyle>
+            <a:lvl1pPr marL="0" indent="0" algn="ctr">
+              <a:buNone/>
+              <a:defRPr sz="3403" b="1" u="sng" baseline="0">
+                <a:solidFill>
+                  <a:schemeClr val="accent5">
+                    <a:lumMod val="50000"/>
+                  </a:schemeClr>
+                </a:solidFill>
+              </a:defRPr>
+            </a:lvl1pPr>
+          </a:lstStyle>
+          <a:p>
+            <a:pPr lvl="0"/>
+            <a:r>
+              <a:rPr lang="en-US" dirty="0"/>
+              <a:t>(click to edit) INTRODUCTION or ABSTRACT</a:t>
+            </a:r>
+          </a:p>
+        </p:txBody>
+      </p:sp>
+      <p:sp>
+        <p:nvSpPr>
+          <p:cNvPr id="20" name="Text Placeholder 5"/>
+          <p:cNvSpPr>
+            <a:spLocks noGrp="1"/>
+          </p:cNvSpPr>
+          <p:nvPr>
+            <p:ph type="body" sz="quarter" idx="20" hasCustomPrompt="1"/>
+          </p:nvPr>
+        </p:nvSpPr>
+        <p:spPr>
+          <a:xfrm>
+            <a:off x="465987" y="13063904"/>
+            <a:ext cx="9801454" cy="708327"/>
+          </a:xfrm>
+          <a:prstGeom prst="rect">
+            <a:avLst/>
+          </a:prstGeom>
+          <a:noFill/>
+        </p:spPr>
+        <p:txBody>
+          <a:bodyPr wrap="square" lIns="91436" tIns="91436" rIns="91436" bIns="91436" anchor="ctr" anchorCtr="0">
+            <a:spAutoFit/>
+          </a:bodyPr>
+          <a:lstStyle>
+            <a:lvl1pPr marL="0" indent="0" algn="ctr">
+              <a:buNone/>
+              <a:defRPr sz="3403" b="1" u="sng" baseline="0">
+                <a:solidFill>
+                  <a:schemeClr val="accent5">
+                    <a:lumMod val="50000"/>
+                  </a:schemeClr>
+                </a:solidFill>
+              </a:defRPr>
+            </a:lvl1pPr>
+          </a:lstStyle>
+          <a:p>
+            <a:pPr lvl="0"/>
+            <a:r>
+              <a:rPr lang="en-US" dirty="0"/>
+              <a:t>(click to edit)  OBJECTIVES</a:t>
+            </a:r>
+          </a:p>
+        </p:txBody>
+      </p:sp>
+      <p:sp>
+        <p:nvSpPr>
+          <p:cNvPr id="21" name="Text Placeholder 3"/>
+          <p:cNvSpPr>
+            <a:spLocks noGrp="1"/>
+          </p:cNvSpPr>
+          <p:nvPr>
+            <p:ph type="body" sz="quarter" idx="21" hasCustomPrompt="1"/>
+          </p:nvPr>
+        </p:nvSpPr>
+        <p:spPr>
+          <a:xfrm>
+            <a:off x="11176227" y="5866321"/>
+            <a:ext cx="9799906" cy="815457"/>
+          </a:xfrm>
+          <a:prstGeom prst="rect">
+            <a:avLst/>
+          </a:prstGeom>
+        </p:spPr>
+        <p:txBody>
+          <a:bodyPr wrap="square" lIns="228589" tIns="228589" rIns="228589" bIns="228589">
+            <a:spAutoFit/>
+          </a:bodyPr>
+          <a:lstStyle>
+            <a:lvl1pPr marL="0" indent="0">
+              <a:buNone/>
+              <a:defRPr sz="2299">
+                <a:solidFill>
+                  <a:schemeClr val="accent5">
+                    <a:lumMod val="50000"/>
+                  </a:schemeClr>
+                </a:solidFill>
+                <a:latin typeface="Times New Roman" pitchFamily="18" charset="0"/>
+                <a:cs typeface="Times New Roman" pitchFamily="18" charset="0"/>
+              </a:defRPr>
+            </a:lvl1pPr>
+            <a:lvl2pPr marL="1366513" indent="-525582">
+              <a:defRPr sz="2299">
+                <a:latin typeface="Trebuchet MS" pitchFamily="34" charset="0"/>
+              </a:defRPr>
+            </a:lvl2pPr>
+            <a:lvl3pPr marL="1892096" indent="-525582">
+              <a:defRPr sz="2299">
+                <a:latin typeface="Trebuchet MS" pitchFamily="34" charset="0"/>
+              </a:defRPr>
+            </a:lvl3pPr>
+            <a:lvl4pPr marL="2470237" indent="-578141">
+              <a:defRPr sz="2299">
+                <a:latin typeface="Trebuchet MS" pitchFamily="34" charset="0"/>
+              </a:defRPr>
+            </a:lvl4pPr>
+            <a:lvl5pPr marL="2890703" indent="-420466">
+              <a:defRPr sz="2299">
+                <a:latin typeface="Trebuchet MS" pitchFamily="34" charset="0"/>
+              </a:defRPr>
+            </a:lvl5pPr>
+          </a:lstStyle>
+          <a:p>
+            <a:pPr lvl="0"/>
+            <a:r>
+              <a:rPr lang="en-US" dirty="0"/>
+              <a:t>Type in or paste your text here</a:t>
+            </a:r>
+          </a:p>
+        </p:txBody>
+      </p:sp>
+      <p:sp>
+        <p:nvSpPr>
+          <p:cNvPr id="22" name="Text Placeholder 5"/>
+          <p:cNvSpPr>
+            <a:spLocks noGrp="1"/>
+          </p:cNvSpPr>
+          <p:nvPr>
+            <p:ph type="body" sz="quarter" idx="22" hasCustomPrompt="1"/>
+          </p:nvPr>
+        </p:nvSpPr>
+        <p:spPr>
+          <a:xfrm>
+            <a:off x="11176228" y="5095798"/>
+            <a:ext cx="9799907" cy="708327"/>
+          </a:xfrm>
+          <a:prstGeom prst="rect">
+            <a:avLst/>
+          </a:prstGeom>
+          <a:noFill/>
+        </p:spPr>
+        <p:txBody>
+          <a:bodyPr lIns="91436" tIns="91436" rIns="91436" bIns="91436" anchor="ctr" anchorCtr="0">
+            <a:spAutoFit/>
+          </a:bodyPr>
+          <a:lstStyle>
+            <a:lvl1pPr marL="0" indent="0" algn="ctr">
+              <a:buNone/>
+              <a:defRPr sz="3403" b="1" u="sng" baseline="0">
+                <a:solidFill>
+                  <a:schemeClr val="accent5">
+                    <a:lumMod val="50000"/>
+                  </a:schemeClr>
+                </a:solidFill>
+              </a:defRPr>
+            </a:lvl1pPr>
+          </a:lstStyle>
+          <a:p>
+            <a:pPr lvl="0"/>
+            <a:r>
+              <a:rPr lang="en-US" dirty="0"/>
+              <a:t>(click to edit)  MATERIALS &amp; METHODS</a:t>
+            </a:r>
+          </a:p>
+        </p:txBody>
+      </p:sp>
+      <p:sp>
+        <p:nvSpPr>
+          <p:cNvPr id="23" name="Text Placeholder 3"/>
+          <p:cNvSpPr>
+            <a:spLocks noGrp="1"/>
+          </p:cNvSpPr>
+          <p:nvPr>
+            <p:ph type="body" sz="quarter" idx="23" hasCustomPrompt="1"/>
+          </p:nvPr>
+        </p:nvSpPr>
+        <p:spPr>
+          <a:xfrm>
+            <a:off x="21830729" y="5866321"/>
+            <a:ext cx="9799906" cy="815457"/>
+          </a:xfrm>
+          <a:prstGeom prst="rect">
+            <a:avLst/>
+          </a:prstGeom>
+        </p:spPr>
+        <p:txBody>
+          <a:bodyPr wrap="square" lIns="228589" tIns="228589" rIns="228589" bIns="228589">
+            <a:spAutoFit/>
+          </a:bodyPr>
+          <a:lstStyle>
+            <a:lvl1pPr marL="0" indent="0">
+              <a:buNone/>
+              <a:defRPr sz="2299">
+                <a:solidFill>
+                  <a:schemeClr val="accent5">
+                    <a:lumMod val="50000"/>
+                  </a:schemeClr>
+                </a:solidFill>
+                <a:latin typeface="Times New Roman" pitchFamily="18" charset="0"/>
+                <a:cs typeface="Times New Roman" pitchFamily="18" charset="0"/>
+              </a:defRPr>
+            </a:lvl1pPr>
+            <a:lvl2pPr marL="1366513" indent="-525582">
+              <a:defRPr sz="2299">
+                <a:latin typeface="Trebuchet MS" pitchFamily="34" charset="0"/>
+              </a:defRPr>
+            </a:lvl2pPr>
+            <a:lvl3pPr marL="1892096" indent="-525582">
+              <a:defRPr sz="2299">
+                <a:latin typeface="Trebuchet MS" pitchFamily="34" charset="0"/>
+              </a:defRPr>
+            </a:lvl3pPr>
+            <a:lvl4pPr marL="2470237" indent="-578141">
+              <a:defRPr sz="2299">
+                <a:latin typeface="Trebuchet MS" pitchFamily="34" charset="0"/>
+              </a:defRPr>
+            </a:lvl4pPr>
+            <a:lvl5pPr marL="2890703" indent="-420466">
+              <a:defRPr sz="2299">
+                <a:latin typeface="Trebuchet MS" pitchFamily="34" charset="0"/>
+              </a:defRPr>
+            </a:lvl5pPr>
+          </a:lstStyle>
+          <a:p>
+            <a:pPr lvl="0"/>
+            <a:r>
+              <a:rPr lang="en-US" dirty="0"/>
+              <a:t>Type in or paste your text here</a:t>
+            </a:r>
+          </a:p>
+        </p:txBody>
+      </p:sp>
+      <p:sp>
+        <p:nvSpPr>
+          <p:cNvPr id="24" name="Text Placeholder 5"/>
+          <p:cNvSpPr>
+            <a:spLocks noGrp="1"/>
+          </p:cNvSpPr>
+          <p:nvPr>
+            <p:ph type="body" sz="quarter" idx="24" hasCustomPrompt="1"/>
+          </p:nvPr>
+        </p:nvSpPr>
+        <p:spPr>
+          <a:xfrm>
+            <a:off x="21822987" y="5095798"/>
+            <a:ext cx="9809196" cy="708327"/>
+          </a:xfrm>
+          <a:prstGeom prst="rect">
+            <a:avLst/>
+          </a:prstGeom>
+          <a:noFill/>
+        </p:spPr>
+        <p:txBody>
+          <a:bodyPr lIns="91436" tIns="91436" rIns="91436" bIns="91436" anchor="ctr" anchorCtr="0">
+            <a:spAutoFit/>
+          </a:bodyPr>
+          <a:lstStyle>
+            <a:lvl1pPr marL="0" indent="0" algn="ctr">
+              <a:buNone/>
+              <a:defRPr sz="3403" b="1" u="sng" baseline="0">
+                <a:solidFill>
+                  <a:schemeClr val="accent5">
+                    <a:lumMod val="50000"/>
+                  </a:schemeClr>
+                </a:solidFill>
+              </a:defRPr>
+            </a:lvl1pPr>
+          </a:lstStyle>
+          <a:p>
+            <a:pPr lvl="0"/>
+            <a:r>
+              <a:rPr lang="en-US" dirty="0"/>
+              <a:t>(click to edit)  RESULTS</a:t>
+            </a:r>
+          </a:p>
+        </p:txBody>
+      </p:sp>
+      <p:sp>
+        <p:nvSpPr>
+          <p:cNvPr id="25" name="Text Placeholder 5"/>
+          <p:cNvSpPr>
+            <a:spLocks noGrp="1"/>
+          </p:cNvSpPr>
+          <p:nvPr>
+            <p:ph type="body" sz="quarter" idx="25" hasCustomPrompt="1"/>
+          </p:nvPr>
+        </p:nvSpPr>
+        <p:spPr>
+          <a:xfrm>
+            <a:off x="32563023" y="5095798"/>
+            <a:ext cx="9798096" cy="708327"/>
+          </a:xfrm>
+          <a:prstGeom prst="rect">
+            <a:avLst/>
+          </a:prstGeom>
+          <a:noFill/>
+        </p:spPr>
+        <p:txBody>
+          <a:bodyPr wrap="square" lIns="91436" tIns="91436" rIns="91436" bIns="91436" anchor="ctr" anchorCtr="0">
+            <a:spAutoFit/>
+          </a:bodyPr>
+          <a:lstStyle>
+            <a:lvl1pPr marL="0" indent="0" algn="ctr">
+              <a:buNone/>
+              <a:defRPr sz="3403" b="1" u="sng" baseline="0">
+                <a:solidFill>
+                  <a:schemeClr val="accent5">
+                    <a:lumMod val="50000"/>
+                  </a:schemeClr>
+                </a:solidFill>
+              </a:defRPr>
+            </a:lvl1pPr>
+          </a:lstStyle>
+          <a:p>
+            <a:pPr lvl="0"/>
+            <a:r>
+              <a:rPr lang="en-US" dirty="0"/>
+              <a:t>(click to edit)  CONCLUSIONS</a:t>
+            </a:r>
+          </a:p>
+        </p:txBody>
+      </p:sp>
+      <p:sp>
+        <p:nvSpPr>
+          <p:cNvPr id="26" name="Text Placeholder 3"/>
+          <p:cNvSpPr>
+            <a:spLocks noGrp="1"/>
+          </p:cNvSpPr>
+          <p:nvPr>
+            <p:ph type="body" sz="quarter" idx="26" hasCustomPrompt="1"/>
+          </p:nvPr>
+        </p:nvSpPr>
+        <p:spPr>
+          <a:xfrm>
+            <a:off x="32563023" y="5866321"/>
+            <a:ext cx="9798096" cy="815457"/>
+          </a:xfrm>
+          <a:prstGeom prst="rect">
+            <a:avLst/>
+          </a:prstGeom>
+        </p:spPr>
+        <p:txBody>
+          <a:bodyPr wrap="square" lIns="228589" tIns="228589" rIns="228589" bIns="228589">
+            <a:spAutoFit/>
+          </a:bodyPr>
+          <a:lstStyle>
+            <a:lvl1pPr marL="0" indent="0">
+              <a:buNone/>
+              <a:defRPr sz="2299">
+                <a:solidFill>
+                  <a:schemeClr val="accent5">
+                    <a:lumMod val="50000"/>
+                  </a:schemeClr>
+                </a:solidFill>
+                <a:latin typeface="Times New Roman" pitchFamily="18" charset="0"/>
+                <a:cs typeface="Times New Roman" pitchFamily="18" charset="0"/>
+              </a:defRPr>
+            </a:lvl1pPr>
+            <a:lvl2pPr marL="1366513" indent="-525582">
+              <a:defRPr sz="2299">
+                <a:latin typeface="Trebuchet MS" pitchFamily="34" charset="0"/>
+              </a:defRPr>
+            </a:lvl2pPr>
+            <a:lvl3pPr marL="1892096" indent="-525582">
+              <a:defRPr sz="2299">
+                <a:latin typeface="Trebuchet MS" pitchFamily="34" charset="0"/>
+              </a:defRPr>
+            </a:lvl3pPr>
+            <a:lvl4pPr marL="2470237" indent="-578141">
+              <a:defRPr sz="2299">
+                <a:latin typeface="Trebuchet MS" pitchFamily="34" charset="0"/>
+              </a:defRPr>
+            </a:lvl4pPr>
+            <a:lvl5pPr marL="2890703" indent="-420466">
+              <a:defRPr sz="2299">
+                <a:latin typeface="Trebuchet MS" pitchFamily="34" charset="0"/>
+              </a:defRPr>
+            </a:lvl5pPr>
+          </a:lstStyle>
+          <a:p>
+            <a:pPr lvl="0"/>
+            <a:r>
+              <a:rPr lang="en-US" dirty="0"/>
+              <a:t>Type in or paste your text here</a:t>
+            </a:r>
+          </a:p>
+        </p:txBody>
+      </p:sp>
+      <p:sp>
+        <p:nvSpPr>
+          <p:cNvPr id="27" name="Text Placeholder 5"/>
+          <p:cNvSpPr>
+            <a:spLocks noGrp="1"/>
+          </p:cNvSpPr>
+          <p:nvPr>
+            <p:ph type="body" sz="quarter" idx="27" hasCustomPrompt="1"/>
+          </p:nvPr>
+        </p:nvSpPr>
+        <p:spPr>
+          <a:xfrm>
+            <a:off x="32563023" y="13119293"/>
+            <a:ext cx="9798096" cy="708327"/>
+          </a:xfrm>
+          <a:prstGeom prst="rect">
+            <a:avLst/>
+          </a:prstGeom>
+          <a:noFill/>
+        </p:spPr>
+        <p:txBody>
+          <a:bodyPr wrap="square" lIns="91436" tIns="91436" rIns="91436" bIns="91436" anchor="ctr" anchorCtr="0">
+            <a:spAutoFit/>
+          </a:bodyPr>
+          <a:lstStyle>
+            <a:lvl1pPr marL="0" indent="0" algn="ctr">
+              <a:buNone/>
+              <a:defRPr sz="3403" b="1" u="sng" baseline="0">
+                <a:solidFill>
+                  <a:schemeClr val="accent5">
+                    <a:lumMod val="50000"/>
+                  </a:schemeClr>
+                </a:solidFill>
+              </a:defRPr>
+            </a:lvl1pPr>
+          </a:lstStyle>
+          <a:p>
+            <a:pPr lvl="0"/>
+            <a:r>
+              <a:rPr lang="en-US" dirty="0"/>
+              <a:t>(click to edit)  REFERENCES</a:t>
+            </a:r>
+          </a:p>
+        </p:txBody>
+      </p:sp>
+      <p:sp>
+        <p:nvSpPr>
+          <p:cNvPr id="28" name="Text Placeholder 3"/>
+          <p:cNvSpPr>
+            <a:spLocks noGrp="1"/>
+          </p:cNvSpPr>
+          <p:nvPr>
+            <p:ph type="body" sz="quarter" idx="28" hasCustomPrompt="1"/>
+          </p:nvPr>
+        </p:nvSpPr>
+        <p:spPr>
+          <a:xfrm>
+            <a:off x="32563023" y="13806060"/>
+            <a:ext cx="9803003" cy="815457"/>
+          </a:xfrm>
+          <a:prstGeom prst="rect">
+            <a:avLst/>
+          </a:prstGeom>
+        </p:spPr>
+        <p:txBody>
+          <a:bodyPr wrap="square" lIns="228589" tIns="228589" rIns="228589" bIns="228589">
+            <a:spAutoFit/>
+          </a:bodyPr>
+          <a:lstStyle>
+            <a:lvl1pPr marL="0" indent="0">
+              <a:buNone/>
+              <a:defRPr sz="2299">
+                <a:solidFill>
+                  <a:schemeClr val="accent5">
+                    <a:lumMod val="50000"/>
+                  </a:schemeClr>
+                </a:solidFill>
+                <a:latin typeface="Times New Roman" pitchFamily="18" charset="0"/>
+                <a:cs typeface="Times New Roman" pitchFamily="18" charset="0"/>
+              </a:defRPr>
+            </a:lvl1pPr>
+            <a:lvl2pPr marL="1366513" indent="-525582">
+              <a:defRPr sz="2299">
+                <a:latin typeface="Trebuchet MS" pitchFamily="34" charset="0"/>
+              </a:defRPr>
+            </a:lvl2pPr>
+            <a:lvl3pPr marL="1892096" indent="-525582">
+              <a:defRPr sz="2299">
+                <a:latin typeface="Trebuchet MS" pitchFamily="34" charset="0"/>
+              </a:defRPr>
+            </a:lvl3pPr>
+            <a:lvl4pPr marL="2470237" indent="-578141">
+              <a:defRPr sz="2299">
+                <a:latin typeface="Trebuchet MS" pitchFamily="34" charset="0"/>
+              </a:defRPr>
+            </a:lvl4pPr>
+            <a:lvl5pPr marL="2890703" indent="-420466">
+              <a:defRPr sz="2299">
+                <a:latin typeface="Trebuchet MS" pitchFamily="34" charset="0"/>
+              </a:defRPr>
+            </a:lvl5pPr>
+          </a:lstStyle>
+          <a:p>
+            <a:pPr lvl="0"/>
+            <a:r>
+              <a:rPr lang="en-US" dirty="0"/>
+              <a:t>Type in or paste your text here</a:t>
+            </a:r>
+          </a:p>
+        </p:txBody>
+      </p:sp>
+      <p:sp>
+        <p:nvSpPr>
+          <p:cNvPr id="29" name="Text Placeholder 5"/>
+          <p:cNvSpPr>
+            <a:spLocks noGrp="1"/>
+          </p:cNvSpPr>
+          <p:nvPr>
+            <p:ph type="body" sz="quarter" idx="29" hasCustomPrompt="1"/>
+          </p:nvPr>
+        </p:nvSpPr>
+        <p:spPr>
+          <a:xfrm>
+            <a:off x="32563023" y="23610057"/>
+            <a:ext cx="9798096" cy="708327"/>
+          </a:xfrm>
+          <a:prstGeom prst="rect">
+            <a:avLst/>
+          </a:prstGeom>
+          <a:noFill/>
+        </p:spPr>
+        <p:txBody>
+          <a:bodyPr wrap="square" lIns="91436" tIns="91436" rIns="91436" bIns="91436" anchor="ctr" anchorCtr="0">
+            <a:spAutoFit/>
+          </a:bodyPr>
+          <a:lstStyle>
+            <a:lvl1pPr marL="0" indent="0" algn="ctr">
+              <a:buNone/>
+              <a:defRPr sz="3403" b="1" u="sng" baseline="0">
+                <a:solidFill>
+                  <a:schemeClr val="accent5">
+                    <a:lumMod val="50000"/>
+                  </a:schemeClr>
+                </a:solidFill>
+              </a:defRPr>
+            </a:lvl1pPr>
+          </a:lstStyle>
+          <a:p>
+            <a:pPr lvl="0"/>
+            <a:r>
+              <a:rPr lang="en-US" dirty="0"/>
+              <a:t>(click to edit)  ACKNOWLEDGEMENTS or  CONTACT</a:t>
+            </a:r>
+          </a:p>
+        </p:txBody>
+      </p:sp>
+      <p:sp>
+        <p:nvSpPr>
+          <p:cNvPr id="30" name="Text Placeholder 3"/>
+          <p:cNvSpPr>
+            <a:spLocks noGrp="1"/>
+          </p:cNvSpPr>
+          <p:nvPr>
+            <p:ph type="body" sz="quarter" idx="30" hasCustomPrompt="1"/>
+          </p:nvPr>
+        </p:nvSpPr>
+        <p:spPr>
+          <a:xfrm>
+            <a:off x="32563023" y="24310970"/>
+            <a:ext cx="9803003" cy="815457"/>
+          </a:xfrm>
+          <a:prstGeom prst="rect">
+            <a:avLst/>
+          </a:prstGeom>
+        </p:spPr>
+        <p:txBody>
+          <a:bodyPr wrap="square" lIns="228589" tIns="228589" rIns="228589" bIns="228589">
+            <a:spAutoFit/>
+          </a:bodyPr>
+          <a:lstStyle>
+            <a:lvl1pPr marL="0" indent="0">
+              <a:buNone/>
+              <a:defRPr sz="2299">
+                <a:solidFill>
+                  <a:schemeClr val="accent5">
+                    <a:lumMod val="50000"/>
+                  </a:schemeClr>
+                </a:solidFill>
+                <a:latin typeface="Times New Roman" pitchFamily="18" charset="0"/>
+                <a:cs typeface="Times New Roman" pitchFamily="18" charset="0"/>
+              </a:defRPr>
+            </a:lvl1pPr>
+            <a:lvl2pPr marL="1366513" indent="-525582">
+              <a:defRPr sz="2299">
+                <a:latin typeface="Trebuchet MS" pitchFamily="34" charset="0"/>
+              </a:defRPr>
+            </a:lvl2pPr>
+            <a:lvl3pPr marL="1892096" indent="-525582">
+              <a:defRPr sz="2299">
+                <a:latin typeface="Trebuchet MS" pitchFamily="34" charset="0"/>
+              </a:defRPr>
+            </a:lvl3pPr>
+            <a:lvl4pPr marL="2470237" indent="-578141">
+              <a:defRPr sz="2299">
+                <a:latin typeface="Trebuchet MS" pitchFamily="34" charset="0"/>
+              </a:defRPr>
+            </a:lvl4pPr>
+            <a:lvl5pPr marL="2890703" indent="-420466">
+              <a:defRPr sz="2299">
+                <a:latin typeface="Trebuchet MS" pitchFamily="34" charset="0"/>
+              </a:defRPr>
+            </a:lvl5pPr>
+          </a:lstStyle>
+          <a:p>
+            <a:pPr lvl="0"/>
+            <a:r>
+              <a:rPr lang="en-US" dirty="0"/>
+              <a:t>Type in or paste your text here</a:t>
+            </a:r>
+          </a:p>
+        </p:txBody>
+      </p:sp>
+      <p:sp>
+        <p:nvSpPr>
+          <p:cNvPr id="60" name="Text Placeholder 3"/>
+          <p:cNvSpPr>
+            <a:spLocks noGrp="1"/>
+          </p:cNvSpPr>
+          <p:nvPr>
+            <p:ph type="body" sz="quarter" idx="96" hasCustomPrompt="1"/>
+          </p:nvPr>
+        </p:nvSpPr>
+        <p:spPr>
+          <a:xfrm>
+            <a:off x="448286" y="13751016"/>
+            <a:ext cx="9807648" cy="815457"/>
+          </a:xfrm>
+          <a:prstGeom prst="rect">
+            <a:avLst/>
+          </a:prstGeom>
+        </p:spPr>
+        <p:txBody>
+          <a:bodyPr wrap="square" lIns="228589" tIns="228589" rIns="228589" bIns="228589">
+            <a:spAutoFit/>
+          </a:bodyPr>
+          <a:lstStyle>
+            <a:lvl1pPr marL="0" indent="0">
+              <a:buNone/>
+              <a:defRPr sz="2299">
+                <a:solidFill>
+                  <a:schemeClr val="accent5">
+                    <a:lumMod val="50000"/>
+                  </a:schemeClr>
+                </a:solidFill>
+                <a:latin typeface="Times New Roman" pitchFamily="18" charset="0"/>
+                <a:cs typeface="Times New Roman" pitchFamily="18" charset="0"/>
+              </a:defRPr>
+            </a:lvl1pPr>
+            <a:lvl2pPr marL="1366513" indent="-525582">
+              <a:defRPr sz="2299">
+                <a:latin typeface="Trebuchet MS" pitchFamily="34" charset="0"/>
+              </a:defRPr>
+            </a:lvl2pPr>
+            <a:lvl3pPr marL="1892096" indent="-525582">
+              <a:defRPr sz="2299">
+                <a:latin typeface="Trebuchet MS" pitchFamily="34" charset="0"/>
+              </a:defRPr>
+            </a:lvl3pPr>
+            <a:lvl4pPr marL="2470237" indent="-578141">
+              <a:defRPr sz="2299">
+                <a:latin typeface="Trebuchet MS" pitchFamily="34" charset="0"/>
+              </a:defRPr>
+            </a:lvl4pPr>
+            <a:lvl5pPr marL="2890703" indent="-420466">
+              <a:defRPr sz="2299">
+                <a:latin typeface="Trebuchet MS" pitchFamily="34" charset="0"/>
+              </a:defRPr>
+            </a:lvl5pPr>
+          </a:lstStyle>
+          <a:p>
+            <a:pPr lvl="0"/>
+            <a:r>
+              <a:rPr lang="en-US" dirty="0"/>
+              <a:t>Type in or paste your text here</a:t>
+            </a:r>
+          </a:p>
+        </p:txBody>
+      </p:sp>
+      <p:sp>
+        <p:nvSpPr>
+          <p:cNvPr id="77" name="Text Placeholder 76"/>
+          <p:cNvSpPr>
+            <a:spLocks noGrp="1"/>
+          </p:cNvSpPr>
+          <p:nvPr>
+            <p:ph type="body" sz="quarter" idx="150" hasCustomPrompt="1"/>
+          </p:nvPr>
+        </p:nvSpPr>
+        <p:spPr>
+          <a:xfrm>
+            <a:off x="5785609" y="3112233"/>
+            <a:ext cx="31206170" cy="1177369"/>
+          </a:xfrm>
+          <a:prstGeom prst="rect">
+            <a:avLst/>
+          </a:prstGeom>
+        </p:spPr>
+        <p:txBody>
+          <a:bodyPr>
+            <a:normAutofit/>
+          </a:bodyPr>
+          <a:lstStyle>
+            <a:lvl1pPr marL="0" indent="0" algn="ctr">
+              <a:buFontTx/>
+              <a:buNone/>
+              <a:defRPr sz="5518">
+                <a:solidFill>
+                  <a:schemeClr val="accent5">
+                    <a:lumMod val="50000"/>
+                  </a:schemeClr>
+                </a:solidFill>
+                <a:latin typeface="+mj-lt"/>
+              </a:defRPr>
+            </a:lvl1pPr>
+            <a:lvl2pPr>
+              <a:buFontTx/>
+              <a:buNone/>
+              <a:defRPr sz="6622"/>
+            </a:lvl2pPr>
+            <a:lvl3pPr>
+              <a:buFontTx/>
+              <a:buNone/>
+              <a:defRPr sz="6622"/>
+            </a:lvl3pPr>
+            <a:lvl4pPr>
+              <a:buFontTx/>
+              <a:buNone/>
+              <a:defRPr sz="6622"/>
+            </a:lvl4pPr>
+            <a:lvl5pPr>
+              <a:buFontTx/>
+              <a:buNone/>
+              <a:defRPr sz="6622"/>
+            </a:lvl5pPr>
+          </a:lstStyle>
+          <a:p>
+            <a:pPr lvl="0"/>
+            <a:r>
+              <a:rPr lang="en-US" dirty="0"/>
+              <a:t>Click here to add affiliations</a:t>
+            </a:r>
+          </a:p>
+        </p:txBody>
+      </p:sp>
+      <p:sp>
+        <p:nvSpPr>
+          <p:cNvPr id="78" name="Text Placeholder 76"/>
+          <p:cNvSpPr>
+            <a:spLocks noGrp="1"/>
+          </p:cNvSpPr>
+          <p:nvPr>
+            <p:ph type="body" sz="quarter" idx="151" hasCustomPrompt="1"/>
+          </p:nvPr>
+        </p:nvSpPr>
+        <p:spPr>
+          <a:xfrm>
+            <a:off x="5785609" y="1934863"/>
+            <a:ext cx="31206170" cy="1177369"/>
+          </a:xfrm>
+          <a:prstGeom prst="rect">
+            <a:avLst/>
+          </a:prstGeom>
+        </p:spPr>
+        <p:txBody>
+          <a:bodyPr anchor="t" anchorCtr="1">
+            <a:normAutofit/>
+          </a:bodyPr>
+          <a:lstStyle>
+            <a:lvl1pPr marL="0" indent="0" algn="ctr">
+              <a:buFontTx/>
+              <a:buNone/>
+              <a:defRPr sz="8093">
+                <a:solidFill>
+                  <a:schemeClr val="accent5">
+                    <a:lumMod val="50000"/>
+                  </a:schemeClr>
+                </a:solidFill>
+                <a:latin typeface="+mj-lt"/>
+              </a:defRPr>
+            </a:lvl1pPr>
+            <a:lvl2pPr>
+              <a:buFontTx/>
+              <a:buNone/>
+              <a:defRPr sz="6622"/>
+            </a:lvl2pPr>
+            <a:lvl3pPr>
+              <a:buFontTx/>
+              <a:buNone/>
+              <a:defRPr sz="6622"/>
+            </a:lvl3pPr>
+            <a:lvl4pPr>
+              <a:buFontTx/>
+              <a:buNone/>
+              <a:defRPr sz="6622"/>
+            </a:lvl4pPr>
+            <a:lvl5pPr>
+              <a:buFontTx/>
+              <a:buNone/>
+              <a:defRPr sz="6622"/>
+            </a:lvl5pPr>
+          </a:lstStyle>
+          <a:p>
+            <a:pPr lvl="0"/>
+            <a:r>
+              <a:rPr lang="en-US" dirty="0"/>
+              <a:t>Click here to add authors</a:t>
+            </a:r>
+          </a:p>
+        </p:txBody>
+      </p:sp>
+      <p:sp>
+        <p:nvSpPr>
+          <p:cNvPr id="79" name="Text Placeholder 76"/>
+          <p:cNvSpPr>
+            <a:spLocks noGrp="1"/>
+          </p:cNvSpPr>
+          <p:nvPr>
+            <p:ph type="body" sz="quarter" idx="153" hasCustomPrompt="1"/>
+          </p:nvPr>
+        </p:nvSpPr>
+        <p:spPr>
+          <a:xfrm>
+            <a:off x="5785609" y="428411"/>
+            <a:ext cx="31206170" cy="1506452"/>
+          </a:xfrm>
+          <a:prstGeom prst="rect">
+            <a:avLst/>
+          </a:prstGeom>
+        </p:spPr>
+        <p:txBody>
+          <a:bodyPr anchor="t" anchorCtr="1">
+            <a:normAutofit/>
+          </a:bodyPr>
+          <a:lstStyle>
+            <a:lvl1pPr marL="0" indent="0" algn="ctr">
+              <a:buFontTx/>
+              <a:buNone/>
+              <a:defRPr sz="10577" b="1">
+                <a:solidFill>
+                  <a:schemeClr val="accent5">
+                    <a:lumMod val="50000"/>
+                  </a:schemeClr>
+                </a:solidFill>
+                <a:latin typeface="+mj-lt"/>
+              </a:defRPr>
+            </a:lvl1pPr>
+            <a:lvl2pPr>
+              <a:buFontTx/>
+              <a:buNone/>
+              <a:defRPr sz="6622"/>
+            </a:lvl2pPr>
+            <a:lvl3pPr>
+              <a:buFontTx/>
+              <a:buNone/>
+              <a:defRPr sz="6622"/>
+            </a:lvl3pPr>
+            <a:lvl4pPr>
+              <a:buFontTx/>
+              <a:buNone/>
+              <a:defRPr sz="6622"/>
+            </a:lvl4pPr>
+            <a:lvl5pPr>
+              <a:buFontTx/>
+              <a:buNone/>
+              <a:defRPr sz="6622"/>
+            </a:lvl5pPr>
+          </a:lstStyle>
+          <a:p>
+            <a:pPr lvl="0"/>
+            <a:r>
+              <a:rPr lang="en-US" dirty="0"/>
+              <a:t>Click here to add title</a:t>
+            </a:r>
+          </a:p>
+        </p:txBody>
+      </p:sp>
+    </p:spTree>
+    <p:extLst>
+      <p:ext uri="{BB962C8B-B14F-4D97-AF65-F5344CB8AC3E}">
+        <p14:creationId xmlns:p14="http://schemas.microsoft.com/office/powerpoint/2010/main" val="2591032560"/>
+      </p:ext>
+    </p:extLst>
+  </p:cSld>
+  <p:clrMapOvr>
+    <a:masterClrMapping/>
+  </p:clrMapOvr>
+</p:sldLayout>
+</file>
+
+<file path=ppt/slideLayouts/slideLayout4.xml><?xml version="1.0" encoding="utf-8"?>
 <p:sldLayout xmlns:a="http://schemas.openxmlformats.org/drawingml/2006/main" xmlns:r="http://schemas.openxmlformats.org/officeDocument/2006/relationships" xmlns:p="http://schemas.openxmlformats.org/presentationml/2006/main" preserve="1" userDrawn="1">
   <p:cSld name="Without guides">
     <p:spTree>
@@ -3423,7 +5433,7 @@
                   </a:txBody>
                   <a:tcPr marL="89175" marR="89175" marT="42049" marB="42049">
                     <a:blipFill rotWithShape="1">
-                      <a:blip r:embed="rId3"/>
+                      <a:blip r:embed="rId5"/>
                       <a:stretch>
                         <a:fillRect/>
                       </a:stretch>
@@ -3672,7 +5682,7 @@
                   </a:txBody>
                   <a:tcPr marL="89175" marR="89175" marT="42049" marB="42049">
                     <a:blipFill rotWithShape="1">
-                      <a:blip r:embed="rId4"/>
+                      <a:blip r:embed="rId6"/>
                       <a:stretch>
                         <a:fillRect/>
                       </a:stretch>
@@ -4060,7 +6070,7 @@
                   </a:txBody>
                   <a:tcPr marL="178349" marR="89175" marT="126147" marB="42049">
                     <a:blipFill rotWithShape="1">
-                      <a:blip r:embed="rId5"/>
+                      <a:blip r:embed="rId7"/>
                       <a:stretch>
                         <a:fillRect/>
                       </a:stretch>
@@ -4218,7 +6228,7 @@
                   </a:txBody>
                   <a:tcPr marL="178349" marR="89175" marT="126147" marB="42049">
                     <a:blipFill rotWithShape="1">
-                      <a:blip r:embed="rId6"/>
+                      <a:blip r:embed="rId8"/>
                       <a:stretch>
                         <a:fillRect/>
                       </a:stretch>
@@ -4422,7 +6432,7 @@
                           <a:solidFill>
                             <a:srgbClr val="FFC000"/>
                           </a:solidFill>
-                          <a:hlinkClick r:id="rId7">
+                          <a:hlinkClick r:id="rId9">
                             <a:extLst>
                               <a:ext uri="{A12FA001-AC4F-418D-AE19-62706E023703}">
                                 <ahyp:hlinkClr xmlns:ahyp="http://schemas.microsoft.com/office/drawing/2018/hyperlinkcolor" val="tx"/>
@@ -4505,7 +6515,7 @@
                   </a:txBody>
                   <a:tcPr marL="182880" marT="137160">
                     <a:blipFill rotWithShape="1">
-                      <a:blip r:embed="rId8"/>
+                      <a:blip r:embed="rId10"/>
                       <a:stretch>
                         <a:fillRect/>
                       </a:stretch>
@@ -4652,7 +6662,7 @@
                   </a:txBody>
                   <a:tcPr marL="182880" marT="137160">
                     <a:blipFill rotWithShape="1">
-                      <a:blip r:embed="rId9"/>
+                      <a:blip r:embed="rId11"/>
                       <a:stretch>
                         <a:fillRect/>
                       </a:stretch>
@@ -4713,7 +6723,7 @@
                   </a:txBody>
                   <a:tcPr marL="178349" marR="89175" marT="126147" marB="42049">
                     <a:blipFill dpi="0" rotWithShape="1">
-                      <a:blip r:embed="rId10">
+                      <a:blip r:embed="rId12">
                         <a:extLst>
                           <a:ext uri="{28A0092B-C50C-407E-A947-70E740481C1C}">
                             <a14:useLocalDpi xmlns:a14="http://schemas.microsoft.com/office/drawing/2010/main" val="0"/>
@@ -5524,7 +7534,7 @@
                   </a:txBody>
                   <a:tcPr marL="178349" marR="89175" marT="126147" marB="42049">
                     <a:blipFill dpi="0" rotWithShape="1">
-                      <a:blip r:embed="rId11">
+                      <a:blip r:embed="rId13">
                         <a:extLst>
                           <a:ext uri="{28A0092B-C50C-407E-A947-70E740481C1C}">
                             <a14:useLocalDpi xmlns:a14="http://schemas.microsoft.com/office/drawing/2010/main" val="0"/>
@@ -5825,6 +7835,8 @@
   <p:clrMap bg1="lt1" tx1="dk1" bg2="lt2" tx2="dk2" accent1="accent1" accent2="accent2" accent3="accent3" accent4="accent4" accent5="accent5" accent6="accent6" hlink="hlink" folHlink="folHlink"/>
   <p:sldLayoutIdLst>
     <p:sldLayoutId id="2147483652" r:id="rId1"/>
+    <p:sldLayoutId id="2147483655" r:id="rId2"/>
+    <p:sldLayoutId id="2147483699" r:id="rId3"/>
   </p:sldLayoutIdLst>
   <p:txStyles>
     <p:titleStyle>
@@ -6841,36 +8853,6 @@
       </p:sp>
       <p:sp>
         <p:nvSpPr>
-          <p:cNvPr id="102" name="Text Placeholder 101">
-            <a:extLst>
-              <a:ext uri="{FF2B5EF4-FFF2-40B4-BE49-F238E27FC236}">
-                <a16:creationId xmlns:a16="http://schemas.microsoft.com/office/drawing/2014/main" id="{54FAC610-AA8B-4244-8F06-6E0DE1A9D297}"/>
-              </a:ext>
-            </a:extLst>
-          </p:cNvPr>
-          <p:cNvSpPr>
-            <a:spLocks noGrp="1"/>
-          </p:cNvSpPr>
-          <p:nvPr>
-            <p:ph type="body" sz="quarter" idx="151"/>
-          </p:nvPr>
-        </p:nvSpPr>
-        <p:spPr/>
-        <p:txBody>
-          <a:bodyPr>
-            <a:normAutofit/>
-          </a:bodyPr>
-          <a:lstStyle/>
-          <a:p>
-            <a:r>
-              <a:rPr lang="en-US" sz="6600" dirty="0"/>
-              <a:t>Giulia Bergonzoli, Ettore Busani, Sebastian Castellano, Lucia Gregorini</a:t>
-            </a:r>
-          </a:p>
-        </p:txBody>
-      </p:sp>
-      <p:sp>
-        <p:nvSpPr>
           <p:cNvPr id="103" name="Text Placeholder 102">
             <a:extLst>
               <a:ext uri="{FF2B5EF4-FFF2-40B4-BE49-F238E27FC236}">
@@ -6887,8 +8869,8 @@
         </p:nvSpPr>
         <p:spPr>
           <a:xfrm>
-            <a:off x="5471881" y="428411"/>
-            <a:ext cx="31860000" cy="1506452"/>
+            <a:off x="4463881" y="428411"/>
+            <a:ext cx="33876000" cy="2700000"/>
           </a:xfrm>
         </p:spPr>
         <p:txBody>
@@ -6899,11 +8881,83 @@
           <a:p>
             <a:r>
               <a:rPr lang="en-US" sz="8800" dirty="0"/>
-              <a:t>The effect of immigration on scholastic scores in European countries</a:t>
+              <a:t>Immigrant students in Europe suffer from lower grades and some social and scholastic features are the key to explain it</a:t>
             </a:r>
           </a:p>
         </p:txBody>
       </p:sp>
+      <p:pic>
+        <p:nvPicPr>
+          <p:cNvPr id="27" name="Immagine 4" descr="Immagine che contiene testo, segnale, calibro&#10;&#10;Descrizione generata automaticamente">
+            <a:extLst>
+              <a:ext uri="{FF2B5EF4-FFF2-40B4-BE49-F238E27FC236}">
+                <a16:creationId xmlns:a16="http://schemas.microsoft.com/office/drawing/2014/main" id="{BB99F4A2-7FC3-8EBC-5451-6F929DBF2832}"/>
+              </a:ext>
+            </a:extLst>
+          </p:cNvPr>
+          <p:cNvPicPr>
+            <a:picLocks noChangeAspect="1"/>
+          </p:cNvPicPr>
+          <p:nvPr/>
+        </p:nvPicPr>
+        <p:blipFill>
+          <a:blip r:embed="rId2">
+            <a:extLst>
+              <a:ext uri="{28A0092B-C50C-407E-A947-70E740481C1C}">
+                <a14:useLocalDpi xmlns:a14="http://schemas.microsoft.com/office/drawing/2010/main" val="0"/>
+              </a:ext>
+            </a:extLst>
+          </a:blip>
+          <a:stretch>
+            <a:fillRect/>
+          </a:stretch>
+        </p:blipFill>
+        <p:spPr>
+          <a:xfrm>
+            <a:off x="35413932" y="2388811"/>
+            <a:ext cx="3600000" cy="1613793"/>
+          </a:xfrm>
+          <a:prstGeom prst="rect">
+            <a:avLst/>
+          </a:prstGeom>
+        </p:spPr>
+      </p:pic>
+      <p:pic>
+        <p:nvPicPr>
+          <p:cNvPr id="23" name="Picture 22" descr="A picture containing logo&#10;&#10;Description automatically generated">
+            <a:extLst>
+              <a:ext uri="{FF2B5EF4-FFF2-40B4-BE49-F238E27FC236}">
+                <a16:creationId xmlns:a16="http://schemas.microsoft.com/office/drawing/2014/main" id="{58B5828A-CCF5-D83B-B7AC-D5D48DA6F232}"/>
+              </a:ext>
+            </a:extLst>
+          </p:cNvPr>
+          <p:cNvPicPr>
+            <a:picLocks noChangeAspect="1"/>
+          </p:cNvPicPr>
+          <p:nvPr/>
+        </p:nvPicPr>
+        <p:blipFill>
+          <a:blip r:embed="rId3">
+            <a:extLst>
+              <a:ext uri="{28A0092B-C50C-407E-A947-70E740481C1C}">
+                <a14:useLocalDpi xmlns:a14="http://schemas.microsoft.com/office/drawing/2010/main" val="0"/>
+              </a:ext>
+            </a:extLst>
+          </a:blip>
+          <a:stretch>
+            <a:fillRect/>
+          </a:stretch>
+        </p:blipFill>
+        <p:spPr>
+          <a:xfrm>
+            <a:off x="2959179" y="1778411"/>
+            <a:ext cx="3600000" cy="2645783"/>
+          </a:xfrm>
+          <a:prstGeom prst="rect">
+            <a:avLst/>
+          </a:prstGeom>
+        </p:spPr>
+      </p:pic>
     </p:spTree>
     <p:extLst>
       <p:ext uri="{BB962C8B-B14F-4D97-AF65-F5344CB8AC3E}">
@@ -7220,7 +9274,7 @@
 <file path=ppt/theme/theme2.xml><?xml version="1.0" encoding="utf-8"?>
 <a:theme xmlns:a="http://schemas.openxmlformats.org/drawingml/2006/main" name="Without guides">
   <a:themeElements>
-    <a:clrScheme name="Office">
+    <a:clrScheme name="Blue Warm">
       <a:dk1>
         <a:sysClr val="windowText" lastClr="000000"/>
       </a:dk1>
@@ -7228,34 +9282,34 @@
         <a:sysClr val="window" lastClr="FFFFFF"/>
       </a:lt1>
       <a:dk2>
-        <a:srgbClr val="44546A"/>
+        <a:srgbClr val="242852"/>
       </a:dk2>
       <a:lt2>
-        <a:srgbClr val="E7E6E6"/>
+        <a:srgbClr val="ACCBF9"/>
       </a:lt2>
       <a:accent1>
-        <a:srgbClr val="5B9BD5"/>
+        <a:srgbClr val="4A66AC"/>
       </a:accent1>
       <a:accent2>
-        <a:srgbClr val="ED7D31"/>
+        <a:srgbClr val="629DD1"/>
       </a:accent2>
       <a:accent3>
-        <a:srgbClr val="A5A5A5"/>
+        <a:srgbClr val="297FD5"/>
       </a:accent3>
       <a:accent4>
-        <a:srgbClr val="FFC000"/>
+        <a:srgbClr val="7F8FA9"/>
       </a:accent4>
       <a:accent5>
-        <a:srgbClr val="4472C4"/>
+        <a:srgbClr val="5AA2AE"/>
       </a:accent5>
       <a:accent6>
-        <a:srgbClr val="70AD47"/>
+        <a:srgbClr val="9D90A0"/>
       </a:accent6>
       <a:hlink>
-        <a:srgbClr val="0563C1"/>
+        <a:srgbClr val="9454C3"/>
       </a:hlink>
       <a:folHlink>
-        <a:srgbClr val="954F72"/>
+        <a:srgbClr val="3EBBF0"/>
       </a:folHlink>
     </a:clrScheme>
     <a:fontScheme name="Office">

</xml_diff>

<commit_message>
changed the folder name for compatibility issue
</commit_message>
<xml_diff>
--- a/Presentations/Poster/Poster template 4 columns.pptx
+++ b/Presentations/Poster/Poster template 4 columns.pptx
@@ -256,7 +256,7 @@
             <a:fld id="{0158C5BC-9A70-462C-B28D-9600239EAC64}" type="datetimeFigureOut">
               <a:rPr lang="en-US" smtClean="0"/>
               <a:pPr/>
-              <a:t>7/20/2022</a:t>
+              <a:t>7/21/22</a:t>
             </a:fld>
             <a:endParaRPr lang="en-US"/>
           </a:p>
@@ -323,7 +323,7 @@
             <a:fld id="{79C131B7-05CA-4AEE-9267-6D0ED4DC84F3}" type="slidenum">
               <a:rPr lang="en-US" smtClean="0"/>
               <a:pPr/>
-              <a:t>‹#›</a:t>
+              <a:t>‹N›</a:t>
             </a:fld>
             <a:endParaRPr lang="en-US"/>
           </a:p>
@@ -423,7 +423,7 @@
             <a:fld id="{E6CC2317-6751-4CD4-9995-8782DD78E936}" type="datetimeFigureOut">
               <a:rPr lang="en-US" smtClean="0"/>
               <a:pPr/>
-              <a:t>7/20/2022</a:t>
+              <a:t>7/21/22</a:t>
             </a:fld>
             <a:endParaRPr lang="en-US" dirty="0"/>
           </a:p>
@@ -584,7 +584,7 @@
             <a:fld id="{26A1A87D-CAF7-4BDC-A0D3-C0DBEDE81619}" type="slidenum">
               <a:rPr lang="en-US" smtClean="0"/>
               <a:pPr/>
-              <a:t>‹#›</a:t>
+              <a:t>‹N›</a:t>
             </a:fld>
             <a:endParaRPr lang="en-US" dirty="0"/>
           </a:p>
@@ -8489,12 +8489,31 @@
             <p:ph type="body" sz="quarter" idx="10"/>
           </p:nvPr>
         </p:nvSpPr>
-        <p:spPr/>
+        <p:spPr>
+          <a:xfrm>
+            <a:off x="448286" y="5866321"/>
+            <a:ext cx="9807648" cy="4141368"/>
+          </a:xfrm>
+        </p:spPr>
         <p:txBody>
           <a:bodyPr/>
           <a:lstStyle/>
           <a:p>
-            <a:endParaRPr lang="en-US"/>
+            <a:r>
+              <a:rPr lang="en-US" dirty="0"/>
+              <a:t>High School years are a fundamental stage of development for each individual, and it’s in the interest of every country to ensure that all students have access to the best possible education and are well integrated into the social system. In reality, we observe that immigration is a huge factor in denying many foreign students from achieving the same results of their native peers. This trend is common to all countries across Europe but some of them show significantly larger gaps with respect to the others.</a:t>
+            </a:r>
+            <a:endParaRPr lang="it-IT" dirty="0"/>
+          </a:p>
+          <a:p>
+            <a:r>
+              <a:rPr lang="en-US" dirty="0"/>
+              <a:t>In this study we aimed at investigating quantitatively the reasons behind all these differences.</a:t>
+            </a:r>
+            <a:endParaRPr lang="it-IT" dirty="0"/>
+          </a:p>
+          <a:p>
+            <a:endParaRPr lang="en-US" dirty="0"/>
           </a:p>
         </p:txBody>
       </p:sp>
@@ -8519,7 +8538,10 @@
           <a:bodyPr/>
           <a:lstStyle/>
           <a:p>
-            <a:endParaRPr lang="en-US"/>
+            <a:r>
+              <a:rPr lang="en-US" dirty="0"/>
+              <a:t>INTRODUCTION</a:t>
+            </a:r>
           </a:p>
         </p:txBody>
       </p:sp>
@@ -8881,7 +8903,7 @@
           <a:p>
             <a:r>
               <a:rPr lang="en-US" sz="8800" dirty="0"/>
-              <a:t>Immigrant students in Europe suffer from lower grades and some social and scholastic features are the key to explain it</a:t>
+              <a:t>Immigrant students in Europe suffer from lower grades, and some social and scholastic features are the key to explain it</a:t>
             </a:r>
           </a:p>
         </p:txBody>

</xml_diff>